<commit_message>
made correlation graph that includes CH4 fluxes
</commit_message>
<xml_diff>
--- a/TanguroN2OLosses-Analysis/Presentations-Data-Interpretation/hobbie-weekly-mtg-Feb2015-methane.pptx
+++ b/TanguroN2OLosses-Analysis/Presentations-Data-Interpretation/hobbie-weekly-mtg-Feb2015-methane.pptx
@@ -5,13 +5,14 @@
     <p:sldMasterId id="2147483648" r:id="rId1"/>
   </p:sldMasterIdLst>
   <p:notesMasterIdLst>
-    <p:notesMasterId r:id="rId6"/>
+    <p:notesMasterId r:id="rId7"/>
   </p:notesMasterIdLst>
   <p:sldIdLst>
     <p:sldId id="256" r:id="rId2"/>
     <p:sldId id="257" r:id="rId3"/>
     <p:sldId id="258" r:id="rId4"/>
-    <p:sldId id="259" r:id="rId5"/>
+    <p:sldId id="260" r:id="rId5"/>
+    <p:sldId id="259" r:id="rId6"/>
   </p:sldIdLst>
   <p:sldSz cx="9144000" cy="6858000" type="screen4x3"/>
   <p:notesSz cx="6858000" cy="9144000"/>
@@ -612,7 +613,7 @@
           <a:p>
             <a:fld id="{48912995-AC55-204D-9368-BD2FBC35F72F}" type="slidenum">
               <a:rPr lang="en-US" smtClean="0"/>
-              <a:t>4</a:t>
+              <a:t>5</a:t>
             </a:fld>
             <a:endParaRPr lang="en-US"/>
           </a:p>
@@ -3988,77 +3989,6 @@
       </p:grpSpPr>
       <p:pic>
         <p:nvPicPr>
-          <p:cNvPr id="5" name="Picture 4"/>
-          <p:cNvPicPr>
-            <a:picLocks noChangeAspect="1"/>
-          </p:cNvPicPr>
-          <p:nvPr/>
-        </p:nvPicPr>
-        <p:blipFill>
-          <a:blip r:embed="rId3"/>
-          <a:stretch>
-            <a:fillRect/>
-          </a:stretch>
-        </p:blipFill>
-        <p:spPr>
-          <a:xfrm>
-            <a:off x="110206" y="4976897"/>
-            <a:ext cx="5751422" cy="1822031"/>
-          </a:xfrm>
-          <a:prstGeom prst="rect">
-            <a:avLst/>
-          </a:prstGeom>
-        </p:spPr>
-      </p:pic>
-      <p:pic>
-        <p:nvPicPr>
-          <p:cNvPr id="7" name="Picture 6"/>
-          <p:cNvPicPr>
-            <a:picLocks noChangeAspect="1"/>
-          </p:cNvPicPr>
-          <p:nvPr/>
-        </p:nvPicPr>
-        <p:blipFill>
-          <a:blip r:embed="rId4"/>
-          <a:stretch>
-            <a:fillRect/>
-          </a:stretch>
-        </p:blipFill>
-        <p:spPr>
-          <a:xfrm>
-            <a:off x="118129" y="3295781"/>
-            <a:ext cx="5807674" cy="1828800"/>
-          </a:xfrm>
-          <a:prstGeom prst="rect">
-            <a:avLst/>
-          </a:prstGeom>
-        </p:spPr>
-      </p:pic>
-      <p:pic>
-        <p:nvPicPr>
-          <p:cNvPr id="6" name="Picture 5"/>
-          <p:cNvPicPr>
-            <a:picLocks noChangeAspect="1"/>
-          </p:cNvPicPr>
-          <p:nvPr/>
-        </p:nvPicPr>
-        <p:blipFill rotWithShape="1">
-          <a:blip r:embed="rId5"/>
-          <a:srcRect b="3012"/>
-          <a:stretch/>
-        </p:blipFill>
-        <p:spPr>
-          <a:xfrm>
-            <a:off x="118129" y="1642593"/>
-            <a:ext cx="5721586" cy="1773707"/>
-          </a:xfrm>
-          <a:prstGeom prst="rect">
-            <a:avLst/>
-          </a:prstGeom>
-        </p:spPr>
-      </p:pic>
-      <p:pic>
-        <p:nvPicPr>
           <p:cNvPr id="4" name="Picture 3"/>
           <p:cNvPicPr>
             <a:picLocks noChangeAspect="1"/>
@@ -4066,65 +3996,51 @@
           <p:nvPr/>
         </p:nvPicPr>
         <p:blipFill>
-          <a:blip r:embed="rId6"/>
+          <a:blip r:embed="rId2"/>
           <a:stretch>
             <a:fillRect/>
           </a:stretch>
         </p:blipFill>
         <p:spPr>
           <a:xfrm>
-            <a:off x="118128" y="59072"/>
-            <a:ext cx="5763987" cy="1828800"/>
+            <a:off x="1117600" y="0"/>
+            <a:ext cx="6889387" cy="6858000"/>
           </a:xfrm>
           <a:prstGeom prst="rect">
             <a:avLst/>
           </a:prstGeom>
         </p:spPr>
       </p:pic>
-      <p:sp>
-        <p:nvSpPr>
-          <p:cNvPr id="8" name="Title 1"/>
-          <p:cNvSpPr>
-            <a:spLocks noGrp="1"/>
-          </p:cNvSpPr>
-          <p:nvPr>
-            <p:ph type="title"/>
-          </p:nvPr>
-        </p:nvSpPr>
-        <p:spPr>
-          <a:xfrm>
-            <a:off x="6075556" y="53114"/>
-            <a:ext cx="2915112" cy="6745814"/>
-          </a:xfrm>
-        </p:spPr>
-        <p:txBody>
-          <a:bodyPr>
-            <a:normAutofit/>
-          </a:bodyPr>
-          <a:lstStyle/>
-          <a:p>
-            <a:r>
-              <a:rPr lang="en-US" sz="2400" dirty="0" smtClean="0"/>
-              <a:t>Some of these fits are pretty terrible – why would N2O and CH4 sometimes be terrible on their own without the other also being terrible?</a:t>
-            </a:r>
-            <a:br>
-              <a:rPr lang="en-US" sz="2400" dirty="0" smtClean="0"/>
-            </a:br>
-            <a:r>
-              <a:rPr lang="en-US" sz="2400" dirty="0"/>
-              <a:t/>
-            </a:r>
-            <a:br>
-              <a:rPr lang="en-US" sz="2400" dirty="0"/>
-            </a:br>
-            <a:r>
-              <a:rPr lang="en-US" sz="2400" dirty="0" smtClean="0"/>
-              <a:t>Eric says that if the CO2 fit is good, the data stays in.  Right now I only bump samples if the respiration fit is poor… thoughts?</a:t>
-            </a:r>
-            <a:endParaRPr lang="en-US" sz="2400" dirty="0"/>
-          </a:p>
-        </p:txBody>
-      </p:sp>
+    </p:spTree>
+    <p:extLst>
+      <p:ext uri="{BB962C8B-B14F-4D97-AF65-F5344CB8AC3E}">
+        <p14:creationId xmlns:p14="http://schemas.microsoft.com/office/powerpoint/2010/main" val="2045496643"/>
+      </p:ext>
+    </p:extLst>
+  </p:cSld>
+  <p:clrMapOvr>
+    <a:masterClrMapping/>
+  </p:clrMapOvr>
+</p:sld>
+</file>
+
+<file path=ppt/slides/slide5.xml><?xml version="1.0" encoding="utf-8"?>
+<p:sld xmlns:a="http://schemas.openxmlformats.org/drawingml/2006/main" xmlns:r="http://schemas.openxmlformats.org/officeDocument/2006/relationships" xmlns:p="http://schemas.openxmlformats.org/presentationml/2006/main">
+  <p:cSld>
+    <p:spTree>
+      <p:nvGrpSpPr>
+        <p:cNvPr id="1" name=""/>
+        <p:cNvGrpSpPr/>
+        <p:nvPr/>
+      </p:nvGrpSpPr>
+      <p:grpSpPr>
+        <a:xfrm>
+          <a:off x="0" y="0"/>
+          <a:ext cx="0" cy="0"/>
+          <a:chOff x="0" y="0"/>
+          <a:chExt cx="0" cy="0"/>
+        </a:xfrm>
+      </p:grpSpPr>
     </p:spTree>
     <p:extLst>
       <p:ext uri="{BB962C8B-B14F-4D97-AF65-F5344CB8AC3E}">

</xml_diff>

<commit_message>
Finished ppt to show to Sarah during weekly mtg
</commit_message>
<xml_diff>
--- a/TanguroN2OLosses-Analysis/Presentations-Data-Interpretation/hobbie-weekly-mtg-Feb2015-methane.pptx
+++ b/TanguroN2OLosses-Analysis/Presentations-Data-Interpretation/hobbie-weekly-mtg-Feb2015-methane.pptx
@@ -5,14 +5,16 @@
     <p:sldMasterId id="2147483648" r:id="rId1"/>
   </p:sldMasterIdLst>
   <p:notesMasterIdLst>
-    <p:notesMasterId r:id="rId7"/>
+    <p:notesMasterId r:id="rId9"/>
   </p:notesMasterIdLst>
   <p:sldIdLst>
     <p:sldId id="256" r:id="rId2"/>
     <p:sldId id="257" r:id="rId3"/>
     <p:sldId id="258" r:id="rId4"/>
     <p:sldId id="260" r:id="rId5"/>
-    <p:sldId id="259" r:id="rId6"/>
+    <p:sldId id="262" r:id="rId6"/>
+    <p:sldId id="261" r:id="rId7"/>
+    <p:sldId id="259" r:id="rId8"/>
   </p:sldIdLst>
   <p:sldSz cx="9144000" cy="6858000" type="screen4x3"/>
   <p:notesSz cx="6858000" cy="9144000"/>
@@ -613,7 +615,7 @@
           <a:p>
             <a:fld id="{48912995-AC55-204D-9368-BD2FBC35F72F}" type="slidenum">
               <a:rPr lang="en-US" smtClean="0"/>
-              <a:t>5</a:t>
+              <a:t>7</a:t>
             </a:fld>
             <a:endParaRPr lang="en-US"/>
           </a:p>
@@ -4041,6 +4043,248 @@
           <a:chExt cx="0" cy="0"/>
         </a:xfrm>
       </p:grpSpPr>
+      <p:sp>
+        <p:nvSpPr>
+          <p:cNvPr id="5" name="Title 1"/>
+          <p:cNvSpPr>
+            <a:spLocks noGrp="1"/>
+          </p:cNvSpPr>
+          <p:nvPr>
+            <p:ph type="title"/>
+          </p:nvPr>
+        </p:nvSpPr>
+        <p:spPr>
+          <a:xfrm>
+            <a:off x="0" y="53114"/>
+            <a:ext cx="9144000" cy="1606370"/>
+          </a:xfrm>
+        </p:spPr>
+        <p:txBody>
+          <a:bodyPr>
+            <a:normAutofit/>
+          </a:bodyPr>
+          <a:lstStyle/>
+          <a:p>
+            <a:r>
+              <a:rPr lang="en-US" sz="2400" dirty="0" smtClean="0"/>
+              <a:t>OK, so looks like weak methane uptake in both </a:t>
+            </a:r>
+            <a:r>
+              <a:rPr lang="en-US" sz="2400" dirty="0" err="1" smtClean="0"/>
+              <a:t>ag</a:t>
+            </a:r>
+            <a:r>
+              <a:rPr lang="en-US" sz="2400" dirty="0" smtClean="0"/>
+              <a:t> systems, and more clear uptake in forests.  But standard deviations are consistently crossing zero.  </a:t>
+            </a:r>
+            <a:r>
+              <a:rPr lang="en-US" sz="2400" dirty="0" err="1" smtClean="0"/>
+              <a:t>Ugggggggg</a:t>
+            </a:r>
+            <a:r>
+              <a:rPr lang="en-US" sz="2400" dirty="0" smtClean="0"/>
+              <a:t> – how to interpret when we already know that there are clear chamber to chamber differences?</a:t>
+            </a:r>
+            <a:endParaRPr lang="en-US" sz="2400" dirty="0"/>
+          </a:p>
+        </p:txBody>
+      </p:sp>
+      <p:pic>
+        <p:nvPicPr>
+          <p:cNvPr id="2" name="Picture 1"/>
+          <p:cNvPicPr>
+            <a:picLocks noChangeAspect="1"/>
+          </p:cNvPicPr>
+          <p:nvPr/>
+        </p:nvPicPr>
+        <p:blipFill>
+          <a:blip r:embed="rId2"/>
+          <a:stretch>
+            <a:fillRect/>
+          </a:stretch>
+        </p:blipFill>
+        <p:spPr>
+          <a:xfrm>
+            <a:off x="0" y="2267777"/>
+            <a:ext cx="9144000" cy="3191390"/>
+          </a:xfrm>
+          <a:prstGeom prst="rect">
+            <a:avLst/>
+          </a:prstGeom>
+        </p:spPr>
+      </p:pic>
+    </p:spTree>
+    <p:extLst>
+      <p:ext uri="{BB962C8B-B14F-4D97-AF65-F5344CB8AC3E}">
+        <p14:creationId xmlns:p14="http://schemas.microsoft.com/office/powerpoint/2010/main" val="3931962987"/>
+      </p:ext>
+    </p:extLst>
+  </p:cSld>
+  <p:clrMapOvr>
+    <a:masterClrMapping/>
+  </p:clrMapOvr>
+</p:sld>
+</file>
+
+<file path=ppt/slides/slide6.xml><?xml version="1.0" encoding="utf-8"?>
+<p:sld xmlns:a="http://schemas.openxmlformats.org/drawingml/2006/main" xmlns:r="http://schemas.openxmlformats.org/officeDocument/2006/relationships" xmlns:p="http://schemas.openxmlformats.org/presentationml/2006/main">
+  <p:cSld>
+    <p:spTree>
+      <p:nvGrpSpPr>
+        <p:cNvPr id="1" name=""/>
+        <p:cNvGrpSpPr/>
+        <p:nvPr/>
+      </p:nvGrpSpPr>
+      <p:grpSpPr>
+        <a:xfrm>
+          <a:off x="0" y="0"/>
+          <a:ext cx="0" cy="0"/>
+          <a:chOff x="0" y="0"/>
+          <a:chExt cx="0" cy="0"/>
+        </a:xfrm>
+      </p:grpSpPr>
+      <p:pic>
+        <p:nvPicPr>
+          <p:cNvPr id="4" name="Picture 3"/>
+          <p:cNvPicPr>
+            <a:picLocks noChangeAspect="1"/>
+          </p:cNvPicPr>
+          <p:nvPr/>
+        </p:nvPicPr>
+        <p:blipFill>
+          <a:blip r:embed="rId2"/>
+          <a:stretch>
+            <a:fillRect/>
+          </a:stretch>
+        </p:blipFill>
+        <p:spPr>
+          <a:xfrm>
+            <a:off x="692207" y="0"/>
+            <a:ext cx="4898571" cy="6858000"/>
+          </a:xfrm>
+          <a:prstGeom prst="rect">
+            <a:avLst/>
+          </a:prstGeom>
+        </p:spPr>
+      </p:pic>
+      <p:sp>
+        <p:nvSpPr>
+          <p:cNvPr id="5" name="Title 1"/>
+          <p:cNvSpPr>
+            <a:spLocks noGrp="1"/>
+          </p:cNvSpPr>
+          <p:nvPr>
+            <p:ph type="title"/>
+          </p:nvPr>
+        </p:nvSpPr>
+        <p:spPr>
+          <a:xfrm>
+            <a:off x="6075556" y="53114"/>
+            <a:ext cx="2915112" cy="6745814"/>
+          </a:xfrm>
+        </p:spPr>
+        <p:txBody>
+          <a:bodyPr>
+            <a:normAutofit/>
+          </a:bodyPr>
+          <a:lstStyle/>
+          <a:p>
+            <a:r>
+              <a:rPr lang="en-US" sz="2400" dirty="0" smtClean="0"/>
+              <a:t>So we can compare to the other trace gases.</a:t>
+            </a:r>
+            <a:endParaRPr lang="en-US" sz="2400" dirty="0"/>
+          </a:p>
+        </p:txBody>
+      </p:sp>
+    </p:spTree>
+    <p:extLst>
+      <p:ext uri="{BB962C8B-B14F-4D97-AF65-F5344CB8AC3E}">
+        <p14:creationId xmlns:p14="http://schemas.microsoft.com/office/powerpoint/2010/main" val="3837424302"/>
+      </p:ext>
+    </p:extLst>
+  </p:cSld>
+  <p:clrMapOvr>
+    <a:masterClrMapping/>
+  </p:clrMapOvr>
+</p:sld>
+</file>
+
+<file path=ppt/slides/slide7.xml><?xml version="1.0" encoding="utf-8"?>
+<p:sld xmlns:a="http://schemas.openxmlformats.org/drawingml/2006/main" xmlns:r="http://schemas.openxmlformats.org/officeDocument/2006/relationships" xmlns:p="http://schemas.openxmlformats.org/presentationml/2006/main">
+  <p:cSld>
+    <p:spTree>
+      <p:nvGrpSpPr>
+        <p:cNvPr id="1" name=""/>
+        <p:cNvGrpSpPr/>
+        <p:nvPr/>
+      </p:nvGrpSpPr>
+      <p:grpSpPr>
+        <a:xfrm>
+          <a:off x="0" y="0"/>
+          <a:ext cx="0" cy="0"/>
+          <a:chOff x="0" y="0"/>
+          <a:chExt cx="0" cy="0"/>
+        </a:xfrm>
+      </p:grpSpPr>
+      <p:pic>
+        <p:nvPicPr>
+          <p:cNvPr id="3" name="Picture 2"/>
+          <p:cNvPicPr>
+            <a:picLocks noChangeAspect="1"/>
+          </p:cNvPicPr>
+          <p:nvPr/>
+        </p:nvPicPr>
+        <p:blipFill>
+          <a:blip r:embed="rId3"/>
+          <a:stretch>
+            <a:fillRect/>
+          </a:stretch>
+        </p:blipFill>
+        <p:spPr>
+          <a:xfrm>
+            <a:off x="0" y="381000"/>
+            <a:ext cx="9144000" cy="6096000"/>
+          </a:xfrm>
+          <a:prstGeom prst="rect">
+            <a:avLst/>
+          </a:prstGeom>
+        </p:spPr>
+      </p:pic>
+      <p:sp>
+        <p:nvSpPr>
+          <p:cNvPr id="9" name="Title 1"/>
+          <p:cNvSpPr>
+            <a:spLocks noGrp="1"/>
+          </p:cNvSpPr>
+          <p:nvPr>
+            <p:ph type="title"/>
+          </p:nvPr>
+        </p:nvSpPr>
+        <p:spPr>
+          <a:xfrm>
+            <a:off x="457200" y="53114"/>
+            <a:ext cx="8229600" cy="389933"/>
+          </a:xfrm>
+        </p:spPr>
+        <p:txBody>
+          <a:bodyPr>
+            <a:normAutofit fontScale="90000"/>
+          </a:bodyPr>
+          <a:lstStyle/>
+          <a:p>
+            <a:r>
+              <a:rPr lang="en-US" sz="2400" dirty="0" smtClean="0"/>
+              <a:t>Moisture and soil </a:t>
+            </a:r>
+            <a:r>
+              <a:rPr lang="en-US" sz="2400" smtClean="0"/>
+              <a:t>temp relationships</a:t>
+            </a:r>
+            <a:endParaRPr lang="en-US" sz="2400" dirty="0"/>
+          </a:p>
+        </p:txBody>
+      </p:sp>
     </p:spTree>
     <p:extLst>
       <p:ext uri="{BB962C8B-B14F-4D97-AF65-F5344CB8AC3E}">

</xml_diff>